<commit_message>
* tests/data/ja/visio2007.vdx: Added new file. * tests/data/ja/*2007*: update.
</commit_message>
<xml_diff>
--- a/tests/data/ja/powerpoint2007.pptx
+++ b/tests/data/ja/powerpoint2007.pptx
@@ -256,7 +256,7 @@
             <a:fld id="{BB264123-831E-4B43-A003-2804DFB8654F}" type="datetime1">
               <a:rPr lang="ja-JP" altLang="en-US"/>
               <a:pPr/>
-              <a:t>2006/12/27</a:t>
+              <a:t>2007/1/26</a:t>
             </a:fld>
             <a:endParaRPr lang="en-US" altLang="ja-JP"/>
           </a:p>
@@ -435,7 +435,7 @@
         <p:nvSpPr>
           <p:cNvPr id="2057" name="Rectangle 9"/>
           <p:cNvSpPr>
-            <a:spLocks noChangeArrowheads="1"/>
+            <a:spLocks noGrp="1" noRot="1" noChangeAspect="1" noChangeArrowheads="1"/>
           </p:cNvSpPr>
           <p:nvPr>
             <p:ph type="sldImg" idx="2"/>
@@ -571,7 +571,7 @@
             <a:fld id="{4BECADD2-275C-4121-9EA5-600C8BDCAABD}" type="datetime1">
               <a:rPr lang="ja-JP" altLang="en-US"/>
               <a:pPr/>
-              <a:t>2006/12/27</a:t>
+              <a:t>2007/1/26</a:t>
             </a:fld>
             <a:endParaRPr lang="en-US" altLang="ja-JP"/>
           </a:p>
@@ -4431,7 +4431,7 @@
         <p:nvSpPr>
           <p:cNvPr id="4098" name="Rectangle 2"/>
           <p:cNvSpPr>
-            <a:spLocks noChangeArrowheads="1"/>
+            <a:spLocks noGrp="1" noChangeArrowheads="1"/>
           </p:cNvSpPr>
           <p:nvPr>
             <p:ph type="ctrTitle"/>
@@ -4460,7 +4460,7 @@
         <p:nvSpPr>
           <p:cNvPr id="4099" name="Rectangle 3"/>
           <p:cNvSpPr>
-            <a:spLocks noChangeArrowheads="1"/>
+            <a:spLocks noGrp="1" noChangeArrowheads="1"/>
           </p:cNvSpPr>
           <p:nvPr>
             <p:ph type="subTitle" idx="1"/>
@@ -4482,26 +4482,42 @@
           <a:p>
             <a:r>
               <a:rPr lang="ja-JP" altLang="ja-JP" dirty="0"/>
-              <a:t>Copyright (C) 2000</a:t>
-            </a:r>
-            <a:r>
-              <a:rPr lang="ja-JP" altLang="en-US" dirty="0"/>
+              <a:t>Copyright (C) </a:t>
+            </a:r>
+            <a:r>
+              <a:rPr lang="ja-JP" altLang="ja-JP" dirty="0">
+                <a:latin typeface="+mn-ea"/>
+              </a:rPr>
+              <a:t>2000</a:t>
+            </a:r>
+            <a:r>
+              <a:rPr lang="ja-JP" altLang="en-US" dirty="0">
+                <a:latin typeface="+mn-ea"/>
+              </a:rPr>
               <a:t> </a:t>
             </a:r>
             <a:r>
-              <a:rPr lang="en-US" altLang="ja-JP" dirty="0"/>
+              <a:rPr lang="en-US" altLang="ja-JP" dirty="0">
+                <a:latin typeface="+mn-ea"/>
+              </a:rPr>
               <a:t>- </a:t>
             </a:r>
             <a:r>
-              <a:rPr lang="ja-JP" altLang="ja-JP" dirty="0" smtClean="0"/>
+              <a:rPr lang="ja-JP" altLang="ja-JP" dirty="0" smtClean="0">
+                <a:latin typeface="+mn-ea"/>
+              </a:rPr>
               <a:t>200</a:t>
             </a:r>
             <a:r>
-              <a:rPr lang="en-US" altLang="ja-JP" dirty="0" smtClean="0"/>
-              <a:t>6</a:t>
-            </a:r>
-            <a:r>
-              <a:rPr lang="ja-JP" altLang="ja-JP" dirty="0" smtClean="0"/>
+              <a:rPr lang="en-US" altLang="ja-JP" dirty="0" smtClean="0">
+                <a:latin typeface="+mn-ea"/>
+              </a:rPr>
+              <a:t>7</a:t>
+            </a:r>
+            <a:r>
+              <a:rPr lang="ja-JP" altLang="ja-JP" dirty="0" smtClean="0">
+                <a:latin typeface="+mn-ea"/>
+              </a:rPr>
               <a:t> </a:t>
             </a:r>
             <a:r>
@@ -4541,7 +4557,7 @@
         <p:nvSpPr>
           <p:cNvPr id="7170" name="Rectangle 2"/>
           <p:cNvSpPr>
-            <a:spLocks noChangeArrowheads="1"/>
+            <a:spLocks noGrp="1" noChangeArrowheads="1"/>
           </p:cNvSpPr>
           <p:nvPr>
             <p:ph type="title"/>
@@ -4570,7 +4586,7 @@
         <p:nvSpPr>
           <p:cNvPr id="7171" name="Rectangle 3"/>
           <p:cNvSpPr>
-            <a:spLocks noChangeArrowheads="1"/>
+            <a:spLocks noGrp="1" noChangeArrowheads="1"/>
           </p:cNvSpPr>
           <p:nvPr>
             <p:ph type="body" idx="1"/>
@@ -4627,7 +4643,7 @@
         <p:nvSpPr>
           <p:cNvPr id="8194" name="Rectangle 2"/>
           <p:cNvSpPr>
-            <a:spLocks noChangeArrowheads="1"/>
+            <a:spLocks noGrp="1" noChangeArrowheads="1"/>
           </p:cNvSpPr>
           <p:nvPr>
             <p:ph type="title"/>
@@ -4656,7 +4672,7 @@
         <p:nvSpPr>
           <p:cNvPr id="8195" name="Rectangle 3"/>
           <p:cNvSpPr>
-            <a:spLocks noChangeArrowheads="1"/>
+            <a:spLocks noGrp="1" noChangeArrowheads="1"/>
           </p:cNvSpPr>
           <p:nvPr>
             <p:ph type="body" idx="1"/>

</xml_diff>